<commit_message>
Création du rapport, regroupement de la gestion de projet dans le rapport
</commit_message>
<xml_diff>
--- a/Diagrammes et Cahiers/cahiers des tests.pptx
+++ b/Diagrammes et Cahiers/cahiers des tests.pptx
@@ -199,7 +199,7 @@
           <a:p>
             <a:fld id="{33589D84-61C4-4B88-AB7D-052D6546558C}" type="datetimeFigureOut">
               <a:rPr lang="fr-FR" smtClean="0"/>
-              <a:t>05/01/2016</a:t>
+              <a:t>08/01/2016</a:t>
             </a:fld>
             <a:endParaRPr lang="fr-FR"/>
           </a:p>
@@ -598,7 +598,7 @@
           <a:p>
             <a:fld id="{5992FC65-3672-427A-AF3F-40285A3B9693}" type="datetimeFigureOut">
               <a:rPr lang="fr-FR" smtClean="0"/>
-              <a:t>05/01/2016</a:t>
+              <a:t>08/01/2016</a:t>
             </a:fld>
             <a:endParaRPr lang="fr-FR"/>
           </a:p>
@@ -768,7 +768,7 @@
           <a:p>
             <a:fld id="{5992FC65-3672-427A-AF3F-40285A3B9693}" type="datetimeFigureOut">
               <a:rPr lang="fr-FR" smtClean="0"/>
-              <a:t>05/01/2016</a:t>
+              <a:t>08/01/2016</a:t>
             </a:fld>
             <a:endParaRPr lang="fr-FR"/>
           </a:p>
@@ -948,7 +948,7 @@
           <a:p>
             <a:fld id="{5992FC65-3672-427A-AF3F-40285A3B9693}" type="datetimeFigureOut">
               <a:rPr lang="fr-FR" smtClean="0"/>
-              <a:t>05/01/2016</a:t>
+              <a:t>08/01/2016</a:t>
             </a:fld>
             <a:endParaRPr lang="fr-FR"/>
           </a:p>
@@ -1118,7 +1118,7 @@
           <a:p>
             <a:fld id="{5992FC65-3672-427A-AF3F-40285A3B9693}" type="datetimeFigureOut">
               <a:rPr lang="fr-FR" smtClean="0"/>
-              <a:t>05/01/2016</a:t>
+              <a:t>08/01/2016</a:t>
             </a:fld>
             <a:endParaRPr lang="fr-FR"/>
           </a:p>
@@ -1364,7 +1364,7 @@
           <a:p>
             <a:fld id="{5992FC65-3672-427A-AF3F-40285A3B9693}" type="datetimeFigureOut">
               <a:rPr lang="fr-FR" smtClean="0"/>
-              <a:t>05/01/2016</a:t>
+              <a:t>08/01/2016</a:t>
             </a:fld>
             <a:endParaRPr lang="fr-FR"/>
           </a:p>
@@ -1596,7 +1596,7 @@
           <a:p>
             <a:fld id="{5992FC65-3672-427A-AF3F-40285A3B9693}" type="datetimeFigureOut">
               <a:rPr lang="fr-FR" smtClean="0"/>
-              <a:t>05/01/2016</a:t>
+              <a:t>08/01/2016</a:t>
             </a:fld>
             <a:endParaRPr lang="fr-FR"/>
           </a:p>
@@ -1963,7 +1963,7 @@
           <a:p>
             <a:fld id="{5992FC65-3672-427A-AF3F-40285A3B9693}" type="datetimeFigureOut">
               <a:rPr lang="fr-FR" smtClean="0"/>
-              <a:t>05/01/2016</a:t>
+              <a:t>08/01/2016</a:t>
             </a:fld>
             <a:endParaRPr lang="fr-FR"/>
           </a:p>
@@ -2081,7 +2081,7 @@
           <a:p>
             <a:fld id="{5992FC65-3672-427A-AF3F-40285A3B9693}" type="datetimeFigureOut">
               <a:rPr lang="fr-FR" smtClean="0"/>
-              <a:t>05/01/2016</a:t>
+              <a:t>08/01/2016</a:t>
             </a:fld>
             <a:endParaRPr lang="fr-FR"/>
           </a:p>
@@ -2176,7 +2176,7 @@
           <a:p>
             <a:fld id="{5992FC65-3672-427A-AF3F-40285A3B9693}" type="datetimeFigureOut">
               <a:rPr lang="fr-FR" smtClean="0"/>
-              <a:t>05/01/2016</a:t>
+              <a:t>08/01/2016</a:t>
             </a:fld>
             <a:endParaRPr lang="fr-FR"/>
           </a:p>
@@ -2453,7 +2453,7 @@
           <a:p>
             <a:fld id="{5992FC65-3672-427A-AF3F-40285A3B9693}" type="datetimeFigureOut">
               <a:rPr lang="fr-FR" smtClean="0"/>
-              <a:t>05/01/2016</a:t>
+              <a:t>08/01/2016</a:t>
             </a:fld>
             <a:endParaRPr lang="fr-FR"/>
           </a:p>
@@ -2706,7 +2706,7 @@
           <a:p>
             <a:fld id="{5992FC65-3672-427A-AF3F-40285A3B9693}" type="datetimeFigureOut">
               <a:rPr lang="fr-FR" smtClean="0"/>
-              <a:t>05/01/2016</a:t>
+              <a:t>08/01/2016</a:t>
             </a:fld>
             <a:endParaRPr lang="fr-FR"/>
           </a:p>
@@ -2919,7 +2919,7 @@
           <a:p>
             <a:fld id="{5992FC65-3672-427A-AF3F-40285A3B9693}" type="datetimeFigureOut">
               <a:rPr lang="fr-FR" smtClean="0"/>
-              <a:t>05/01/2016</a:t>
+              <a:t>08/01/2016</a:t>
             </a:fld>
             <a:endParaRPr lang="fr-FR"/>
           </a:p>
@@ -3333,14 +3333,14 @@
           <p:nvPr>
             <p:extLst>
               <p:ext uri="{D42A27DB-BD31-4B8C-83A1-F6EECF244321}">
-                <p14:modId xmlns:p14="http://schemas.microsoft.com/office/powerpoint/2010/main" val="2071985943"/>
+                <p14:modId xmlns:p14="http://schemas.microsoft.com/office/powerpoint/2010/main" val="2114097485"/>
               </p:ext>
             </p:extLst>
           </p:nvPr>
         </p:nvGraphicFramePr>
         <p:xfrm>
           <a:off x="-2626819" y="0"/>
-          <a:ext cx="14818820" cy="13406844"/>
+          <a:ext cx="14818820" cy="14595564"/>
         </p:xfrm>
         <a:graphic>
           <a:graphicData uri="http://schemas.openxmlformats.org/drawingml/2006/table">
@@ -3389,11 +3389,7 @@
                       <a:pPr algn="ctr"/>
                       <a:r>
                         <a:rPr lang="fr-FR" sz="4400" dirty="0" smtClean="0"/>
-                        <a:t>Test </a:t>
-                      </a:r>
-                      <a:r>
-                        <a:rPr lang="fr-FR" sz="4400" dirty="0" smtClean="0"/>
-                        <a:t>du déclenchement du moteur</a:t>
+                        <a:t>Test du déclenchement du moteur</a:t>
                       </a:r>
                       <a:endParaRPr lang="fr-FR" sz="4400" dirty="0"/>
                     </a:p>
@@ -3460,11 +3456,7 @@
                       </a:r>
                       <a:r>
                         <a:rPr lang="fr-FR" sz="3200" baseline="0" dirty="0" smtClean="0"/>
-                        <a:t> ont bien été prévus </a:t>
-                      </a:r>
-                      <a:r>
-                        <a:rPr lang="fr-FR" sz="3200" baseline="0" dirty="0" smtClean="0"/>
-                        <a:t>et que le moteur est bien déclenché à la bonne intensité à la réception de la commande</a:t>
+                        <a:t> ont bien été prévus et que le moteur est bien déclenché à la bonne intensité à la réception de la commande</a:t>
                       </a:r>
                       <a:endParaRPr lang="fr-FR" sz="3200" dirty="0"/>
                     </a:p>
@@ -3829,11 +3821,7 @@
                       <a:pPr algn="ctr"/>
                       <a:r>
                         <a:rPr lang="fr-FR" dirty="0" smtClean="0"/>
-                        <a:t>Déclenchement des deux moteurs vers l’avant à </a:t>
-                      </a:r>
-                      <a:r>
-                        <a:rPr lang="fr-FR" dirty="0" err="1" smtClean="0"/>
-                        <a:t>mi-intensité</a:t>
+                        <a:t>Les moteurs s’allument et el robot ne bouge pas</a:t>
                       </a:r>
                       <a:endParaRPr lang="fr-FR" dirty="0"/>
                     </a:p>
@@ -3873,7 +3861,23 @@
                     <a:bodyPr/>
                     <a:lstStyle/>
                     <a:p>
-                      <a:pPr algn="ctr"/>
+                      <a:pPr marL="0" marR="0" indent="0" algn="ctr" defTabSz="914400" rtl="0" eaLnBrk="1" fontAlgn="auto" latinLnBrk="0" hangingPunct="1">
+                        <a:lnSpc>
+                          <a:spcPct val="100000"/>
+                        </a:lnSpc>
+                        <a:spcBef>
+                          <a:spcPts val="0"/>
+                        </a:spcBef>
+                        <a:spcAft>
+                          <a:spcPts val="0"/>
+                        </a:spcAft>
+                        <a:buClrTx/>
+                        <a:buSzTx/>
+                        <a:buFontTx/>
+                        <a:buNone/>
+                        <a:tabLst/>
+                        <a:defRPr/>
+                      </a:pPr>
                       <a:r>
                         <a:rPr lang="fr-FR" dirty="0" smtClean="0"/>
                         <a:t>Passer</a:t>
@@ -3884,11 +3888,95 @@
                       </a:r>
                       <a:r>
                         <a:rPr lang="fr-FR" dirty="0" smtClean="0"/>
-                        <a:t> deux nombres entiers </a:t>
-                      </a:r>
+                        <a:t> deux nombres entiers positifs supérieurs à 128 égaux</a:t>
+                      </a:r>
+                    </a:p>
+                  </a:txBody>
+                  <a:tcPr/>
+                </a:tc>
+                <a:tc>
+                  <a:txBody>
+                    <a:bodyPr/>
+                    <a:lstStyle/>
+                    <a:p>
+                      <a:pPr algn="ctr"/>
                       <a:r>
                         <a:rPr lang="fr-FR" dirty="0" smtClean="0"/>
-                        <a:t>positifs différents supérieurs</a:t>
+                        <a:t>255,255</a:t>
+                      </a:r>
+                      <a:endParaRPr lang="fr-FR" dirty="0"/>
+                    </a:p>
+                  </a:txBody>
+                  <a:tcPr/>
+                </a:tc>
+                <a:tc>
+                  <a:txBody>
+                    <a:bodyPr/>
+                    <a:lstStyle/>
+                    <a:p>
+                      <a:pPr algn="ctr"/>
+                      <a:r>
+                        <a:rPr lang="fr-FR" dirty="0" smtClean="0"/>
+                        <a:t>Déclenchement</a:t>
+                      </a:r>
+                      <a:r>
+                        <a:rPr lang="fr-FR" baseline="0" dirty="0" smtClean="0"/>
+                        <a:t> des deux moteurs </a:t>
+                      </a:r>
+                      <a:r>
+                        <a:rPr lang="fr-FR" baseline="0" smtClean="0"/>
+                        <a:t>vers l’avant</a:t>
+                      </a:r>
+                      <a:endParaRPr lang="fr-FR" dirty="0"/>
+                    </a:p>
+                  </a:txBody>
+                  <a:tcPr/>
+                </a:tc>
+                <a:tc>
+                  <a:txBody>
+                    <a:bodyPr/>
+                    <a:lstStyle/>
+                    <a:p>
+                      <a:pPr algn="ctr"/>
+                      <a:endParaRPr lang="fr-FR" dirty="0"/>
+                    </a:p>
+                  </a:txBody>
+                  <a:tcPr/>
+                </a:tc>
+              </a:tr>
+              <a:tr h="979714">
+                <a:tc>
+                  <a:txBody>
+                    <a:bodyPr/>
+                    <a:lstStyle/>
+                    <a:p>
+                      <a:pPr algn="ctr"/>
+                      <a:r>
+                        <a:rPr lang="fr-FR" sz="2800" dirty="0" smtClean="0"/>
+                        <a:t>3</a:t>
+                      </a:r>
+                      <a:endParaRPr lang="fr-FR" sz="2800" dirty="0"/>
+                    </a:p>
+                  </a:txBody>
+                  <a:tcPr/>
+                </a:tc>
+                <a:tc>
+                  <a:txBody>
+                    <a:bodyPr/>
+                    <a:lstStyle/>
+                    <a:p>
+                      <a:pPr algn="ctr"/>
+                      <a:r>
+                        <a:rPr lang="fr-FR" dirty="0" smtClean="0"/>
+                        <a:t>Passer</a:t>
+                      </a:r>
+                      <a:r>
+                        <a:rPr lang="fr-FR" baseline="0" dirty="0" smtClean="0"/>
+                        <a:t> en paramètre à la fonction</a:t>
+                      </a:r>
+                      <a:r>
+                        <a:rPr lang="fr-FR" dirty="0" smtClean="0"/>
+                        <a:t> deux nombres entiers positifs différents supérieurs</a:t>
                       </a:r>
                       <a:r>
                         <a:rPr lang="fr-FR" baseline="0" dirty="0" smtClean="0"/>
@@ -3926,7 +4014,11 @@
                       </a:r>
                       <a:r>
                         <a:rPr lang="fr-FR" baseline="0" dirty="0" smtClean="0"/>
-                        <a:t> des deux moteurs vers l’avant à intensité différentes (le robot avance en diagonale)</a:t>
+                        <a:t> des deux moteurs vers l’avant à intensité différentes (le robot avance en </a:t>
+                      </a:r>
+                      <a:r>
+                        <a:rPr lang="fr-FR" baseline="0" dirty="0" smtClean="0"/>
+                        <a:t>arc de cercle)</a:t>
                       </a:r>
                       <a:endParaRPr lang="fr-FR" dirty="0"/>
                     </a:p>
@@ -3954,7 +4046,7 @@
                       <a:pPr algn="ctr"/>
                       <a:r>
                         <a:rPr lang="fr-FR" sz="2800" dirty="0" smtClean="0"/>
-                        <a:t>3</a:t>
+                        <a:t>4</a:t>
                       </a:r>
                       <a:endParaRPr lang="fr-FR" sz="2800" dirty="0"/>
                     </a:p>
@@ -3977,11 +4069,7 @@
                       </a:r>
                       <a:r>
                         <a:rPr lang="fr-FR" dirty="0" smtClean="0"/>
-                        <a:t> deux nombres entiers </a:t>
-                      </a:r>
-                      <a:r>
-                        <a:rPr lang="fr-FR" dirty="0" smtClean="0"/>
-                        <a:t>positifs différents inférieurs à 128</a:t>
+                        <a:t> deux nombres entiers positifs différents inférieurs à 128</a:t>
                       </a:r>
                       <a:endParaRPr lang="fr-FR" dirty="0"/>
                     </a:p>
@@ -4015,7 +4103,11 @@
                       </a:r>
                       <a:r>
                         <a:rPr lang="fr-FR" baseline="0" dirty="0" smtClean="0"/>
-                        <a:t> des deux moteurs vers l’arrière à intensité différentes (le robot recule en diagonale)</a:t>
+                        <a:t> des deux moteurs vers l’arrière à intensité différentes (le robot recule en </a:t>
+                      </a:r>
+                      <a:r>
+                        <a:rPr lang="fr-FR" baseline="0" dirty="0" smtClean="0"/>
+                        <a:t>arc de cercle)</a:t>
                       </a:r>
                       <a:endParaRPr lang="fr-FR" dirty="0"/>
                     </a:p>
@@ -4043,7 +4135,7 @@
                       <a:pPr algn="ctr"/>
                       <a:r>
                         <a:rPr lang="fr-FR" sz="2800" dirty="0" smtClean="0"/>
-                        <a:t>4</a:t>
+                        <a:t>5</a:t>
                       </a:r>
                       <a:endParaRPr lang="fr-FR" sz="2800" dirty="0"/>
                     </a:p>
@@ -4066,11 +4158,7 @@
                       </a:r>
                       <a:r>
                         <a:rPr lang="fr-FR" dirty="0" smtClean="0"/>
-                        <a:t> </a:t>
-                      </a:r>
-                      <a:r>
-                        <a:rPr lang="fr-FR" dirty="0" smtClean="0"/>
-                        <a:t>deux fois le</a:t>
+                        <a:t> deux fois le</a:t>
                       </a:r>
                       <a:r>
                         <a:rPr lang="fr-FR" baseline="0" dirty="0" smtClean="0"/>
@@ -4136,7 +4224,7 @@
                       <a:pPr algn="ctr"/>
                       <a:r>
                         <a:rPr lang="fr-FR" sz="2800" dirty="0" smtClean="0"/>
-                        <a:t>5</a:t>
+                        <a:t>6</a:t>
                       </a:r>
                       <a:endParaRPr lang="fr-FR" sz="2800" dirty="0"/>
                     </a:p>
@@ -4221,7 +4309,7 @@
                       <a:pPr algn="ctr"/>
                       <a:r>
                         <a:rPr lang="fr-FR" sz="2800" dirty="0" smtClean="0"/>
-                        <a:t>6</a:t>
+                        <a:t>7</a:t>
                       </a:r>
                       <a:endParaRPr lang="fr-FR" sz="2800" dirty="0"/>
                     </a:p>
@@ -4396,11 +4484,7 @@
                       <a:pPr algn="ctr"/>
                       <a:r>
                         <a:rPr lang="fr-FR" sz="4400" dirty="0" smtClean="0"/>
-                        <a:t>Test </a:t>
-                      </a:r>
-                      <a:r>
-                        <a:rPr lang="fr-FR" sz="4400" dirty="0" smtClean="0"/>
-                        <a:t>de réception des</a:t>
+                        <a:t>Test de réception des</a:t>
                       </a:r>
                       <a:r>
                         <a:rPr lang="fr-FR" sz="4400" baseline="0" dirty="0" smtClean="0"/>
@@ -4467,11 +4551,7 @@
                       <a:pPr algn="ctr"/>
                       <a:r>
                         <a:rPr lang="fr-FR" sz="3200" dirty="0" smtClean="0"/>
-                        <a:t>Vérifier que </a:t>
-                      </a:r>
-                      <a:r>
-                        <a:rPr lang="fr-FR" sz="3200" dirty="0" smtClean="0"/>
-                        <a:t>les commandes</a:t>
+                        <a:t>Vérifier que les commandes</a:t>
                       </a:r>
                       <a:r>
                         <a:rPr lang="fr-FR" sz="3200" baseline="0" dirty="0" smtClean="0"/>
@@ -5298,11 +5378,7 @@
                       <a:pPr algn="ctr"/>
                       <a:r>
                         <a:rPr lang="fr-FR" sz="4400" dirty="0" smtClean="0"/>
-                        <a:t>Test </a:t>
-                      </a:r>
-                      <a:r>
-                        <a:rPr lang="fr-FR" sz="4400" dirty="0" smtClean="0"/>
-                        <a:t>d’envoi des</a:t>
+                        <a:t>Test d’envoi des</a:t>
                       </a:r>
                       <a:r>
                         <a:rPr lang="fr-FR" sz="4400" baseline="0" dirty="0" smtClean="0"/>
@@ -5369,11 +5445,7 @@
                       <a:pPr algn="ctr"/>
                       <a:r>
                         <a:rPr lang="fr-FR" sz="3200" dirty="0" smtClean="0"/>
-                        <a:t>Vérifier que </a:t>
-                      </a:r>
-                      <a:r>
-                        <a:rPr lang="fr-FR" sz="3200" dirty="0" smtClean="0"/>
-                        <a:t>les commandes</a:t>
+                        <a:t>Vérifier que les commandes</a:t>
                       </a:r>
                       <a:r>
                         <a:rPr lang="fr-FR" sz="3200" baseline="0" dirty="0" smtClean="0"/>

</xml_diff>